<commit_message>
all-slides.pdf code.zip pandas.pdf pandas.pptx
</commit_message>
<xml_diff>
--- a/ipsa/slides/pandas.pptx
+++ b/ipsa/slides/pandas.pptx
@@ -134,13 +134,82 @@
 <file path=ppt/revisionInfo.xml><?xml version="1.0" encoding="utf-8"?>
 <p1510:revInfo xmlns:a="http://schemas.openxmlformats.org/drawingml/2006/main" xmlns:r="http://schemas.openxmlformats.org/officeDocument/2006/relationships" xmlns:p1510="http://schemas.microsoft.com/office/powerpoint/2015/10/main">
   <p1510:revLst>
-    <p1510:client id="{1BB2CD8F-D7FA-4E10-A866-6EDCDFAFCE53}" v="3" dt="2023-04-25T09:55:27.851"/>
+    <p1510:client id="{0F1D07A7-7ECE-4FDC-A8AE-477E2DA1B472}" v="4" dt="2024-04-24T07:43:58.850"/>
   </p1510:revLst>
 </p1510:revInfo>
 </file>
 
 <file path=ppt/changesInfos/changesInfo1.xml><?xml version="1.0" encoding="utf-8"?>
 <pc:chgInfo xmlns:a="http://schemas.openxmlformats.org/drawingml/2006/main" xmlns:r="http://schemas.openxmlformats.org/officeDocument/2006/relationships" xmlns:ac="http://schemas.microsoft.com/office/drawing/2013/main/command" xmlns:pc="http://schemas.microsoft.com/office/powerpoint/2013/main/command">
+  <pc:docChgLst>
+    <pc:chgData name="Gerth Stølting Brodal" userId="04ef4784-6591-4f86-a140-f5c3b108582a" providerId="ADAL" clId="{0F1D07A7-7ECE-4FDC-A8AE-477E2DA1B472}"/>
+    <pc:docChg chg="undo custSel modSld">
+      <pc:chgData name="Gerth Stølting Brodal" userId="04ef4784-6591-4f86-a140-f5c3b108582a" providerId="ADAL" clId="{0F1D07A7-7ECE-4FDC-A8AE-477E2DA1B472}" dt="2024-04-24T07:46:13.619" v="218" actId="3064"/>
+      <pc:docMkLst>
+        <pc:docMk/>
+      </pc:docMkLst>
+      <pc:sldChg chg="modSp mod">
+        <pc:chgData name="Gerth Stølting Brodal" userId="04ef4784-6591-4f86-a140-f5c3b108582a" providerId="ADAL" clId="{0F1D07A7-7ECE-4FDC-A8AE-477E2DA1B472}" dt="2024-04-24T07:14:05.663" v="34" actId="113"/>
+        <pc:sldMkLst>
+          <pc:docMk/>
+          <pc:sldMk cId="1106615606" sldId="703"/>
+        </pc:sldMkLst>
+        <pc:spChg chg="mod">
+          <ac:chgData name="Gerth Stølting Brodal" userId="04ef4784-6591-4f86-a140-f5c3b108582a" providerId="ADAL" clId="{0F1D07A7-7ECE-4FDC-A8AE-477E2DA1B472}" dt="2024-04-24T07:14:05.663" v="34" actId="113"/>
+          <ac:spMkLst>
+            <pc:docMk/>
+            <pc:sldMk cId="1106615606" sldId="703"/>
+            <ac:spMk id="3" creationId="{00000000-0000-0000-0000-000000000000}"/>
+          </ac:spMkLst>
+        </pc:spChg>
+        <pc:spChg chg="mod">
+          <ac:chgData name="Gerth Stølting Brodal" userId="04ef4784-6591-4f86-a140-f5c3b108582a" providerId="ADAL" clId="{0F1D07A7-7ECE-4FDC-A8AE-477E2DA1B472}" dt="2024-04-24T07:09:06.027" v="33" actId="14100"/>
+          <ac:spMkLst>
+            <pc:docMk/>
+            <pc:sldMk cId="1106615606" sldId="703"/>
+            <ac:spMk id="7" creationId="{00000000-0000-0000-0000-000000000000}"/>
+          </ac:spMkLst>
+        </pc:spChg>
+      </pc:sldChg>
+      <pc:sldChg chg="modSp mod">
+        <pc:chgData name="Gerth Stølting Brodal" userId="04ef4784-6591-4f86-a140-f5c3b108582a" providerId="ADAL" clId="{0F1D07A7-7ECE-4FDC-A8AE-477E2DA1B472}" dt="2024-04-24T07:18:01.102" v="36" actId="20577"/>
+        <pc:sldMkLst>
+          <pc:docMk/>
+          <pc:sldMk cId="2218329389" sldId="704"/>
+        </pc:sldMkLst>
+        <pc:spChg chg="mod">
+          <ac:chgData name="Gerth Stølting Brodal" userId="04ef4784-6591-4f86-a140-f5c3b108582a" providerId="ADAL" clId="{0F1D07A7-7ECE-4FDC-A8AE-477E2DA1B472}" dt="2024-04-24T07:18:01.102" v="36" actId="20577"/>
+          <ac:spMkLst>
+            <pc:docMk/>
+            <pc:sldMk cId="2218329389" sldId="704"/>
+            <ac:spMk id="3" creationId="{00000000-0000-0000-0000-000000000000}"/>
+          </ac:spMkLst>
+        </pc:spChg>
+      </pc:sldChg>
+      <pc:sldChg chg="addSp modSp mod modNotesTx">
+        <pc:chgData name="Gerth Stølting Brodal" userId="04ef4784-6591-4f86-a140-f5c3b108582a" providerId="ADAL" clId="{0F1D07A7-7ECE-4FDC-A8AE-477E2DA1B472}" dt="2024-04-24T07:46:13.619" v="218" actId="3064"/>
+        <pc:sldMkLst>
+          <pc:docMk/>
+          <pc:sldMk cId="481026778" sldId="712"/>
+        </pc:sldMkLst>
+        <pc:spChg chg="add mod">
+          <ac:chgData name="Gerth Stølting Brodal" userId="04ef4784-6591-4f86-a140-f5c3b108582a" providerId="ADAL" clId="{0F1D07A7-7ECE-4FDC-A8AE-477E2DA1B472}" dt="2024-04-24T07:46:13.619" v="218" actId="3064"/>
+          <ac:spMkLst>
+            <pc:docMk/>
+            <pc:sldMk cId="481026778" sldId="712"/>
+            <ac:spMk id="3" creationId="{3B970628-4B29-E02B-5D54-D015E47C3776}"/>
+          </ac:spMkLst>
+        </pc:spChg>
+      </pc:sldChg>
+      <pc:sldChg chg="modNotesTx">
+        <pc:chgData name="Gerth Stølting Brodal" userId="04ef4784-6591-4f86-a140-f5c3b108582a" providerId="ADAL" clId="{0F1D07A7-7ECE-4FDC-A8AE-477E2DA1B472}" dt="2024-04-24T07:26:24.240" v="77" actId="20577"/>
+        <pc:sldMkLst>
+          <pc:docMk/>
+          <pc:sldMk cId="520497509" sldId="713"/>
+        </pc:sldMkLst>
+      </pc:sldChg>
+    </pc:docChg>
+  </pc:docChgLst>
   <pc:docChgLst>
     <pc:chgData name="Gerth Stølting Brodal" userId="04ef4784-6591-4f86-a140-f5c3b108582a" providerId="ADAL" clId="{9597CAD0-5B7F-477D-B63F-123429BDAB7A}"/>
     <pc:docChg chg="modSld">
@@ -342,7 +411,7 @@
           <a:p>
             <a:fld id="{FB1A172F-81D4-4DC4-9113-1DBD56EC3646}" type="datetimeFigureOut">
               <a:rPr lang="en-US" smtClean="0"/>
-              <a:t>5/1/2023</a:t>
+              <a:t>4/24/2024</a:t>
             </a:fld>
             <a:endParaRPr lang="en-US"/>
           </a:p>
@@ -1138,6 +1207,153 @@
           <a:lstStyle/>
           <a:p>
             <a:r>
+              <a:rPr lang="en-US" dirty="0"/>
+              <a:t>April 2024: In Python 3.12 module "</a:t>
+            </a:r>
+            <a:r>
+              <a:rPr lang="da-DK" b="0" i="0" dirty="0" err="1">
+                <a:solidFill>
+                  <a:srgbClr val="D4D4D4"/>
+                </a:solidFill>
+                <a:effectLst/>
+                <a:latin typeface="Consolas" panose="020B0609020204030204" pitchFamily="49" charset="0"/>
+              </a:rPr>
+              <a:t>distutils</a:t>
+            </a:r>
+            <a:r>
+              <a:rPr lang="da-DK" b="0" i="0" dirty="0">
+                <a:solidFill>
+                  <a:srgbClr val="D4D4D4"/>
+                </a:solidFill>
+                <a:effectLst/>
+                <a:latin typeface="Consolas" panose="020B0609020204030204" pitchFamily="49" charset="0"/>
+              </a:rPr>
+              <a:t>" </a:t>
+            </a:r>
+            <a:r>
+              <a:rPr lang="da-DK" b="0" i="0" dirty="0" err="1">
+                <a:solidFill>
+                  <a:srgbClr val="D4D4D4"/>
+                </a:solidFill>
+                <a:effectLst/>
+                <a:latin typeface="Consolas" panose="020B0609020204030204" pitchFamily="49" charset="0"/>
+              </a:rPr>
+              <a:t>was</a:t>
+            </a:r>
+            <a:r>
+              <a:rPr lang="da-DK" b="0" i="0" dirty="0">
+                <a:solidFill>
+                  <a:srgbClr val="D4D4D4"/>
+                </a:solidFill>
+                <a:effectLst/>
+                <a:latin typeface="Consolas" panose="020B0609020204030204" pitchFamily="49" charset="0"/>
+              </a:rPr>
+              <a:t> removed, </a:t>
+            </a:r>
+            <a:r>
+              <a:rPr lang="da-DK" b="0" i="0" dirty="0" err="1">
+                <a:solidFill>
+                  <a:srgbClr val="D4D4D4"/>
+                </a:solidFill>
+                <a:effectLst/>
+                <a:latin typeface="Consolas" panose="020B0609020204030204" pitchFamily="49" charset="0"/>
+              </a:rPr>
+              <a:t>making</a:t>
+            </a:r>
+            <a:r>
+              <a:rPr lang="da-DK" b="0" i="0" dirty="0">
+                <a:solidFill>
+                  <a:srgbClr val="D4D4D4"/>
+                </a:solidFill>
+                <a:effectLst/>
+                <a:latin typeface="Consolas" panose="020B0609020204030204" pitchFamily="49" charset="0"/>
+              </a:rPr>
+              <a:t> </a:t>
+            </a:r>
+            <a:r>
+              <a:rPr lang="da-DK" b="0" i="0" dirty="0" err="1">
+                <a:solidFill>
+                  <a:srgbClr val="D4D4D4"/>
+                </a:solidFill>
+                <a:effectLst/>
+                <a:latin typeface="Consolas" panose="020B0609020204030204" pitchFamily="49" charset="0"/>
+              </a:rPr>
+              <a:t>datareader</a:t>
+            </a:r>
+            <a:r>
+              <a:rPr lang="da-DK" b="0" i="0" dirty="0">
+                <a:solidFill>
+                  <a:srgbClr val="D4D4D4"/>
+                </a:solidFill>
+                <a:effectLst/>
+                <a:latin typeface="Consolas" panose="020B0609020204030204" pitchFamily="49" charset="0"/>
+              </a:rPr>
+              <a:t> to break (</a:t>
+            </a:r>
+            <a:r>
+              <a:rPr lang="da-DK" b="0" i="0" dirty="0" err="1">
+                <a:solidFill>
+                  <a:srgbClr val="D4D4D4"/>
+                </a:solidFill>
+                <a:effectLst/>
+                <a:latin typeface="Consolas" panose="020B0609020204030204" pitchFamily="49" charset="0"/>
+              </a:rPr>
+              <a:t>will</a:t>
+            </a:r>
+            <a:r>
+              <a:rPr lang="da-DK" b="0" i="0" dirty="0">
+                <a:solidFill>
+                  <a:srgbClr val="D4D4D4"/>
+                </a:solidFill>
+                <a:effectLst/>
+                <a:latin typeface="Consolas" panose="020B0609020204030204" pitchFamily="49" charset="0"/>
+              </a:rPr>
+              <a:t> it </a:t>
+            </a:r>
+            <a:r>
+              <a:rPr lang="da-DK" b="0" i="0" dirty="0" err="1">
+                <a:solidFill>
+                  <a:srgbClr val="D4D4D4"/>
+                </a:solidFill>
+                <a:effectLst/>
+                <a:latin typeface="Consolas" panose="020B0609020204030204" pitchFamily="49" charset="0"/>
+              </a:rPr>
+              <a:t>be</a:t>
+            </a:r>
+            <a:r>
+              <a:rPr lang="da-DK" b="0" i="0" dirty="0">
+                <a:solidFill>
+                  <a:srgbClr val="D4D4D4"/>
+                </a:solidFill>
+                <a:effectLst/>
+                <a:latin typeface="Consolas" panose="020B0609020204030204" pitchFamily="49" charset="0"/>
+              </a:rPr>
+              <a:t> </a:t>
+            </a:r>
+            <a:r>
+              <a:rPr lang="da-DK" b="0" i="0" dirty="0" err="1">
+                <a:solidFill>
+                  <a:srgbClr val="D4D4D4"/>
+                </a:solidFill>
+                <a:effectLst/>
+                <a:latin typeface="Consolas" panose="020B0609020204030204" pitchFamily="49" charset="0"/>
+              </a:rPr>
+              <a:t>fixed</a:t>
+            </a:r>
+            <a:r>
+              <a:rPr lang="da-DK" b="0" i="0" dirty="0">
+                <a:solidFill>
+                  <a:srgbClr val="D4D4D4"/>
+                </a:solidFill>
+                <a:effectLst/>
+                <a:latin typeface="Consolas" panose="020B0609020204030204" pitchFamily="49" charset="0"/>
+              </a:rPr>
+              <a:t>?)</a:t>
+            </a:r>
+            <a:endParaRPr lang="en-US" dirty="0"/>
+          </a:p>
+          <a:p>
+            <a:r>
               <a:rPr lang="en-US" dirty="0" err="1"/>
               <a:t>Datareader</a:t>
             </a:r>
@@ -1723,23 +1939,31 @@
             </a:r>
             <a:r>
               <a:rPr lang="da-DK" baseline="0" dirty="0"/>
-              <a:t> if </a:t>
-            </a:r>
-            <a:r>
-              <a:rPr lang="da-DK" baseline="0" dirty="0" err="1"/>
+              <a:t> </a:t>
+            </a:r>
+            <a:r>
+              <a:rPr lang="da-DK" b="1" baseline="0" dirty="0"/>
+              <a:t>if </a:t>
+            </a:r>
+            <a:r>
+              <a:rPr lang="da-DK" b="1" baseline="0" dirty="0" err="1"/>
               <a:t>somebody</a:t>
             </a:r>
             <a:r>
+              <a:rPr lang="da-DK" b="1" baseline="0" dirty="0"/>
+              <a:t> </a:t>
+            </a:r>
+            <a:r>
+              <a:rPr lang="da-DK" b="1" baseline="0" dirty="0" err="1"/>
+              <a:t>adds</a:t>
+            </a:r>
+            <a:r>
+              <a:rPr lang="da-DK" b="1" baseline="0" dirty="0"/>
+              <a:t> new columns </a:t>
+            </a:r>
+            <a:r>
               <a:rPr lang="da-DK" baseline="0" dirty="0"/>
-              <a:t> </a:t>
-            </a:r>
-            <a:r>
-              <a:rPr lang="da-DK" baseline="0" dirty="0" err="1"/>
-              <a:t>adds</a:t>
-            </a:r>
-            <a:r>
-              <a:rPr lang="da-DK" baseline="0" dirty="0"/>
-              <a:t> new columns to the database? </a:t>
+              <a:t>to the database? </a:t>
             </a:r>
             <a:r>
               <a:rPr lang="da-DK" baseline="0" dirty="0" err="1"/>
@@ -1779,7 +2003,10 @@
               <a:buFont typeface="Arial" panose="020B0604020202020204" pitchFamily="34" charset="0"/>
               <a:buChar char="•"/>
             </a:pPr>
-            <a:endParaRPr lang="en-US" dirty="0"/>
+            <a:r>
+              <a:rPr lang="en-US" dirty="0"/>
+              <a:t>Iceland missing, because no big cities</a:t>
+            </a:r>
           </a:p>
         </p:txBody>
       </p:sp>
@@ -2497,7 +2724,7 @@
           <a:p>
             <a:fld id="{0560A9CD-0304-4E0B-9E82-E7E0115DE05B}" type="datetimeFigureOut">
               <a:rPr lang="en-US" smtClean="0"/>
-              <a:t>5/1/2023</a:t>
+              <a:t>4/24/2024</a:t>
             </a:fld>
             <a:endParaRPr lang="en-US"/>
           </a:p>
@@ -2665,7 +2892,7 @@
           <a:p>
             <a:fld id="{0560A9CD-0304-4E0B-9E82-E7E0115DE05B}" type="datetimeFigureOut">
               <a:rPr lang="en-US" smtClean="0"/>
-              <a:t>5/1/2023</a:t>
+              <a:t>4/24/2024</a:t>
             </a:fld>
             <a:endParaRPr lang="en-US"/>
           </a:p>
@@ -2843,7 +3070,7 @@
           <a:p>
             <a:fld id="{0560A9CD-0304-4E0B-9E82-E7E0115DE05B}" type="datetimeFigureOut">
               <a:rPr lang="en-US" smtClean="0"/>
-              <a:t>5/1/2023</a:t>
+              <a:t>4/24/2024</a:t>
             </a:fld>
             <a:endParaRPr lang="en-US"/>
           </a:p>
@@ -3026,7 +3253,7 @@
           <a:p>
             <a:fld id="{0560A9CD-0304-4E0B-9E82-E7E0115DE05B}" type="datetimeFigureOut">
               <a:rPr lang="en-US" smtClean="0"/>
-              <a:t>5/1/2023</a:t>
+              <a:t>4/24/2024</a:t>
             </a:fld>
             <a:endParaRPr lang="en-US"/>
           </a:p>
@@ -3271,7 +3498,7 @@
           <a:p>
             <a:fld id="{0560A9CD-0304-4E0B-9E82-E7E0115DE05B}" type="datetimeFigureOut">
               <a:rPr lang="en-US" smtClean="0"/>
-              <a:t>5/1/2023</a:t>
+              <a:t>4/24/2024</a:t>
             </a:fld>
             <a:endParaRPr lang="en-US"/>
           </a:p>
@@ -3500,7 +3727,7 @@
           <a:p>
             <a:fld id="{0560A9CD-0304-4E0B-9E82-E7E0115DE05B}" type="datetimeFigureOut">
               <a:rPr lang="en-US" smtClean="0"/>
-              <a:t>5/1/2023</a:t>
+              <a:t>4/24/2024</a:t>
             </a:fld>
             <a:endParaRPr lang="en-US"/>
           </a:p>
@@ -3864,7 +4091,7 @@
           <a:p>
             <a:fld id="{0560A9CD-0304-4E0B-9E82-E7E0115DE05B}" type="datetimeFigureOut">
               <a:rPr lang="en-US" smtClean="0"/>
-              <a:t>5/1/2023</a:t>
+              <a:t>4/24/2024</a:t>
             </a:fld>
             <a:endParaRPr lang="en-US"/>
           </a:p>
@@ -3981,7 +4208,7 @@
           <a:p>
             <a:fld id="{0560A9CD-0304-4E0B-9E82-E7E0115DE05B}" type="datetimeFigureOut">
               <a:rPr lang="en-US" smtClean="0"/>
-              <a:t>5/1/2023</a:t>
+              <a:t>4/24/2024</a:t>
             </a:fld>
             <a:endParaRPr lang="en-US"/>
           </a:p>
@@ -4076,7 +4303,7 @@
           <a:p>
             <a:fld id="{0560A9CD-0304-4E0B-9E82-E7E0115DE05B}" type="datetimeFigureOut">
               <a:rPr lang="en-US" smtClean="0"/>
-              <a:t>5/1/2023</a:t>
+              <a:t>4/24/2024</a:t>
             </a:fld>
             <a:endParaRPr lang="en-US"/>
           </a:p>
@@ -4351,7 +4578,7 @@
           <a:p>
             <a:fld id="{0560A9CD-0304-4E0B-9E82-E7E0115DE05B}" type="datetimeFigureOut">
               <a:rPr lang="en-US" smtClean="0"/>
-              <a:t>5/1/2023</a:t>
+              <a:t>4/24/2024</a:t>
             </a:fld>
             <a:endParaRPr lang="en-US"/>
           </a:p>
@@ -4603,7 +4830,7 @@
           <a:p>
             <a:fld id="{0560A9CD-0304-4E0B-9E82-E7E0115DE05B}" type="datetimeFigureOut">
               <a:rPr lang="en-US" smtClean="0"/>
-              <a:t>5/1/2023</a:t>
+              <a:t>4/24/2024</a:t>
             </a:fld>
             <a:endParaRPr lang="en-US"/>
           </a:p>
@@ -4814,7 +5041,7 @@
           <a:p>
             <a:fld id="{0560A9CD-0304-4E0B-9E82-E7E0115DE05B}" type="datetimeFigureOut">
               <a:rPr lang="en-US" smtClean="0"/>
-              <a:t>5/1/2023</a:t>
+              <a:t>4/24/2024</a:t>
             </a:fld>
             <a:endParaRPr lang="en-US"/>
           </a:p>
@@ -11304,6 +11531,53 @@
           </a:p>
         </p:txBody>
       </p:sp>
+      <p:sp>
+        <p:nvSpPr>
+          <p:cNvPr id="3" name="TextBox 2">
+            <a:extLst>
+              <a:ext uri="{FF2B5EF4-FFF2-40B4-BE49-F238E27FC236}">
+                <a16:creationId xmlns:a16="http://schemas.microsoft.com/office/drawing/2014/main" id="{3B970628-4B29-E02B-5D54-D015E47C3776}"/>
+              </a:ext>
+            </a:extLst>
+          </p:cNvPr>
+          <p:cNvSpPr txBox="1"/>
+          <p:nvPr/>
+        </p:nvSpPr>
+        <p:spPr>
+          <a:xfrm>
+            <a:off x="9698673" y="196333"/>
+            <a:ext cx="2365953" cy="495108"/>
+          </a:xfrm>
+          <a:prstGeom prst="rect">
+            <a:avLst/>
+          </a:prstGeom>
+          <a:noFill/>
+        </p:spPr>
+        <p:txBody>
+          <a:bodyPr wrap="square" lIns="72000" tIns="108000" bIns="108000" rtlCol="0">
+            <a:spAutoFit/>
+          </a:bodyPr>
+          <a:lstStyle/>
+          <a:p>
+            <a:r>
+              <a:rPr lang="da-DK" dirty="0" err="1">
+                <a:highlight>
+                  <a:srgbClr val="FFFF00"/>
+                </a:highlight>
+              </a:rPr>
+              <a:t>Requires</a:t>
+            </a:r>
+            <a:r>
+              <a:rPr lang="da-DK" dirty="0">
+                <a:highlight>
+                  <a:srgbClr val="FFFF00"/>
+                </a:highlight>
+              </a:rPr>
+              <a:t> Python ≤ 3.11</a:t>
+            </a:r>
+          </a:p>
+        </p:txBody>
+      </p:sp>
     </p:spTree>
     <p:extLst>
       <p:ext uri="{BB962C8B-B14F-4D97-AF65-F5344CB8AC3E}">
@@ -16440,7 +16714,15 @@
             </a:r>
             <a:r>
               <a:rPr lang="en-US" dirty="0"/>
-              <a:t>very lightweight version storing a database in a single file,</a:t>
+              <a:t>very lightweight version storing a database in a </a:t>
+            </a:r>
+            <a:r>
+              <a:rPr lang="en-US" b="1" dirty="0"/>
+              <a:t>single file</a:t>
+            </a:r>
+            <a:r>
+              <a:rPr lang="en-US" dirty="0"/>
+              <a:t>,</a:t>
             </a:r>
             <a:br>
               <a:rPr lang="en-US" dirty="0"/>
@@ -16499,8 +16781,8 @@
         </p:nvSpPr>
         <p:spPr>
           <a:xfrm>
-            <a:off x="7712739" y="6103678"/>
-            <a:ext cx="4479261" cy="646331"/>
+            <a:off x="8343900" y="6103678"/>
+            <a:ext cx="3848100" cy="646331"/>
           </a:xfrm>
           <a:prstGeom prst="rect">
             <a:avLst/>
@@ -16520,7 +16802,13 @@
               <a:rPr lang="en-US" dirty="0">
                 <a:hlinkClick r:id="rId3"/>
               </a:rPr>
-              <a:t>Database Systems</a:t>
+              <a:t>Database</a:t>
+            </a:r>
+            <a:r>
+              <a:rPr lang="en-US" dirty="0">
+                <a:hlinkClick r:id="rId3"/>
+              </a:rPr>
+              <a:t>s</a:t>
             </a:r>
             <a:r>
               <a:rPr lang="en-US" dirty="0"/>
@@ -17866,7 +18154,7 @@
             </a:r>
             <a:r>
               <a:rPr lang="en-US" dirty="0"/>
-              <a:t> &lt; 500000</a:t>
+              <a:t> &lt; 700000</a:t>
             </a:r>
             <a:br>
               <a:rPr lang="en-US" dirty="0"/>

</xml_diff>

<commit_message>
project-2-portfolio.md all-slides.pdf pandas.pdf pandas.pptx
</commit_message>
<xml_diff>
--- a/ipsa/slides/pandas.pptx
+++ b/ipsa/slides/pandas.pptx
@@ -144,7 +144,7 @@
   <pc:docChgLst>
     <pc:chgData name="Gerth Stølting Brodal" userId="04ef4784-6591-4f86-a140-f5c3b108582a" providerId="ADAL" clId="{0F1D07A7-7ECE-4FDC-A8AE-477E2DA1B472}"/>
     <pc:docChg chg="undo custSel modSld">
-      <pc:chgData name="Gerth Stølting Brodal" userId="04ef4784-6591-4f86-a140-f5c3b108582a" providerId="ADAL" clId="{0F1D07A7-7ECE-4FDC-A8AE-477E2DA1B472}" dt="2024-04-24T07:46:13.619" v="218" actId="3064"/>
+      <pc:chgData name="Gerth Stølting Brodal" userId="04ef4784-6591-4f86-a140-f5c3b108582a" providerId="ADAL" clId="{0F1D07A7-7ECE-4FDC-A8AE-477E2DA1B472}" dt="2024-04-25T13:59:44.565" v="520" actId="20577"/>
       <pc:docMkLst>
         <pc:docMk/>
       </pc:docMkLst>
@@ -186,20 +186,52 @@
           </ac:spMkLst>
         </pc:spChg>
       </pc:sldChg>
-      <pc:sldChg chg="addSp modSp mod modNotesTx">
-        <pc:chgData name="Gerth Stølting Brodal" userId="04ef4784-6591-4f86-a140-f5c3b108582a" providerId="ADAL" clId="{0F1D07A7-7ECE-4FDC-A8AE-477E2DA1B472}" dt="2024-04-24T07:46:13.619" v="218" actId="3064"/>
+      <pc:sldChg chg="addSp delSp modSp mod modNotesTx">
+        <pc:chgData name="Gerth Stølting Brodal" userId="04ef4784-6591-4f86-a140-f5c3b108582a" providerId="ADAL" clId="{0F1D07A7-7ECE-4FDC-A8AE-477E2DA1B472}" dt="2024-04-25T13:59:44.565" v="520" actId="20577"/>
         <pc:sldMkLst>
           <pc:docMk/>
           <pc:sldMk cId="481026778" sldId="712"/>
         </pc:sldMkLst>
-        <pc:spChg chg="add mod">
-          <ac:chgData name="Gerth Stølting Brodal" userId="04ef4784-6591-4f86-a140-f5c3b108582a" providerId="ADAL" clId="{0F1D07A7-7ECE-4FDC-A8AE-477E2DA1B472}" dt="2024-04-24T07:46:13.619" v="218" actId="3064"/>
+        <pc:spChg chg="add del mod">
+          <ac:chgData name="Gerth Stølting Brodal" userId="04ef4784-6591-4f86-a140-f5c3b108582a" providerId="ADAL" clId="{0F1D07A7-7ECE-4FDC-A8AE-477E2DA1B472}" dt="2024-04-25T13:47:45.861" v="432"/>
           <ac:spMkLst>
             <pc:docMk/>
             <pc:sldMk cId="481026778" sldId="712"/>
             <ac:spMk id="3" creationId="{3B970628-4B29-E02B-5D54-D015E47C3776}"/>
           </ac:spMkLst>
         </pc:spChg>
+        <pc:spChg chg="mod">
+          <ac:chgData name="Gerth Stølting Brodal" userId="04ef4784-6591-4f86-a140-f5c3b108582a" providerId="ADAL" clId="{0F1D07A7-7ECE-4FDC-A8AE-477E2DA1B472}" dt="2024-04-25T13:48:26.479" v="467" actId="1035"/>
+          <ac:spMkLst>
+            <pc:docMk/>
+            <pc:sldMk cId="481026778" sldId="712"/>
+            <ac:spMk id="9" creationId="{00000000-0000-0000-0000-000000000000}"/>
+          </ac:spMkLst>
+        </pc:spChg>
+        <pc:picChg chg="del">
+          <ac:chgData name="Gerth Stølting Brodal" userId="04ef4784-6591-4f86-a140-f5c3b108582a" providerId="ADAL" clId="{0F1D07A7-7ECE-4FDC-A8AE-477E2DA1B472}" dt="2024-04-25T13:38:29.564" v="281" actId="478"/>
+          <ac:picMkLst>
+            <pc:docMk/>
+            <pc:sldMk cId="481026778" sldId="712"/>
+            <ac:picMk id="4" creationId="{00000000-0000-0000-0000-000000000000}"/>
+          </ac:picMkLst>
+        </pc:picChg>
+        <pc:picChg chg="add del mod">
+          <ac:chgData name="Gerth Stølting Brodal" userId="04ef4784-6591-4f86-a140-f5c3b108582a" providerId="ADAL" clId="{0F1D07A7-7ECE-4FDC-A8AE-477E2DA1B472}" dt="2024-04-25T13:38:36.142" v="284" actId="478"/>
+          <ac:picMkLst>
+            <pc:docMk/>
+            <pc:sldMk cId="481026778" sldId="712"/>
+            <ac:picMk id="7" creationId="{B49F5BFF-4C8F-E8B3-D1C8-D7DD7A343B40}"/>
+          </ac:picMkLst>
+        </pc:picChg>
+        <pc:picChg chg="add mod ord modCrop">
+          <ac:chgData name="Gerth Stølting Brodal" userId="04ef4784-6591-4f86-a140-f5c3b108582a" providerId="ADAL" clId="{0F1D07A7-7ECE-4FDC-A8AE-477E2DA1B472}" dt="2024-04-25T13:47:51.149" v="433" actId="1036"/>
+          <ac:picMkLst>
+            <pc:docMk/>
+            <pc:sldMk cId="481026778" sldId="712"/>
+            <ac:picMk id="12" creationId="{F1436066-3A6F-7077-602B-9458C16BC9E7}"/>
+          </ac:picMkLst>
+        </pc:picChg>
       </pc:sldChg>
       <pc:sldChg chg="modNotesTx">
         <pc:chgData name="Gerth Stølting Brodal" userId="04ef4784-6591-4f86-a140-f5c3b108582a" providerId="ADAL" clId="{0F1D07A7-7ECE-4FDC-A8AE-477E2DA1B472}" dt="2024-04-24T07:26:24.240" v="77" actId="20577"/>
@@ -411,7 +443,7 @@
           <a:p>
             <a:fld id="{FB1A172F-81D4-4DC4-9113-1DBD56EC3646}" type="datetimeFigureOut">
               <a:rPr lang="en-US" smtClean="0"/>
-              <a:t>4/24/2024</a:t>
+              <a:t>4/25/2024</a:t>
             </a:fld>
             <a:endParaRPr lang="en-US"/>
           </a:p>
@@ -1208,7 +1240,21 @@
           <a:p>
             <a:r>
               <a:rPr lang="en-US" dirty="0"/>
-              <a:t>April 2024: In Python 3.12 module "</a:t>
+              <a:t>Depends on "</a:t>
+            </a:r>
+            <a:r>
+              <a:rPr lang="en-US" dirty="0" err="1"/>
+              <a:t>distutils</a:t>
+            </a:r>
+            <a:r>
+              <a:rPr lang="en-US" dirty="0"/>
+              <a:t>" module.</a:t>
+            </a:r>
+          </a:p>
+          <a:p>
+            <a:r>
+              <a:rPr lang="en-US" dirty="0"/>
+              <a:t>In Python 3.12 module "</a:t>
             </a:r>
             <a:r>
               <a:rPr lang="da-DK" b="0" i="0" dirty="0" err="1">
@@ -1258,7 +1304,7 @@
                 <a:effectLst/>
                 <a:latin typeface="Consolas" panose="020B0609020204030204" pitchFamily="49" charset="0"/>
               </a:rPr>
-              <a:t>making</a:t>
+              <a:t>instead</a:t>
             </a:r>
             <a:r>
               <a:rPr lang="da-DK" b="0" i="0" dirty="0">
@@ -1278,7 +1324,7 @@
                 <a:effectLst/>
                 <a:latin typeface="Consolas" panose="020B0609020204030204" pitchFamily="49" charset="0"/>
               </a:rPr>
-              <a:t>datareader</a:t>
+              <a:t>use</a:t>
             </a:r>
             <a:r>
               <a:rPr lang="da-DK" b="0" i="0" dirty="0">
@@ -1288,7 +1334,7 @@
                 <a:effectLst/>
                 <a:latin typeface="Consolas" panose="020B0609020204030204" pitchFamily="49" charset="0"/>
               </a:rPr>
-              <a:t> to break (</a:t>
+              <a:t> "</a:t>
             </a:r>
             <a:r>
               <a:rPr lang="da-DK" b="0" i="0" dirty="0" err="1">
@@ -1298,7 +1344,7 @@
                 <a:effectLst/>
                 <a:latin typeface="Consolas" panose="020B0609020204030204" pitchFamily="49" charset="0"/>
               </a:rPr>
-              <a:t>will</a:t>
+              <a:t>setuptools</a:t>
             </a:r>
             <a:r>
               <a:rPr lang="da-DK" b="0" i="0" dirty="0">
@@ -1308,7 +1354,7 @@
                 <a:effectLst/>
                 <a:latin typeface="Consolas" panose="020B0609020204030204" pitchFamily="49" charset="0"/>
               </a:rPr>
-              <a:t> it </a:t>
+              <a:t>" </a:t>
             </a:r>
             <a:r>
               <a:rPr lang="da-DK" b="0" i="0" dirty="0" err="1">
@@ -1318,7 +1364,27 @@
                 <a:effectLst/>
                 <a:latin typeface="Consolas" panose="020B0609020204030204" pitchFamily="49" charset="0"/>
               </a:rPr>
-              <a:t>be</a:t>
+              <a:t>module</a:t>
+            </a:r>
+            <a:r>
+              <a:rPr lang="da-DK" b="0" i="0" dirty="0">
+                <a:solidFill>
+                  <a:srgbClr val="D4D4D4"/>
+                </a:solidFill>
+                <a:effectLst/>
+                <a:latin typeface="Consolas" panose="020B0609020204030204" pitchFamily="49" charset="0"/>
+              </a:rPr>
+              <a:t>, </a:t>
+            </a:r>
+            <a:r>
+              <a:rPr lang="da-DK" b="0" i="0" dirty="0" err="1">
+                <a:solidFill>
+                  <a:srgbClr val="D4D4D4"/>
+                </a:solidFill>
+                <a:effectLst/>
+                <a:latin typeface="Consolas" panose="020B0609020204030204" pitchFamily="49" charset="0"/>
+              </a:rPr>
+              <a:t>that</a:t>
             </a:r>
             <a:r>
               <a:rPr lang="da-DK" b="0" i="0" dirty="0">
@@ -1338,7 +1404,7 @@
                 <a:effectLst/>
                 <a:latin typeface="Consolas" panose="020B0609020204030204" pitchFamily="49" charset="0"/>
               </a:rPr>
-              <a:t>fixed</a:t>
+              <a:t>fills</a:t>
             </a:r>
             <a:r>
               <a:rPr lang="da-DK" b="0" i="0" dirty="0">
@@ -1348,7 +1414,27 @@
                 <a:effectLst/>
                 <a:latin typeface="Consolas" panose="020B0609020204030204" pitchFamily="49" charset="0"/>
               </a:rPr>
-              <a:t>?)</a:t>
+              <a:t> in for </a:t>
+            </a:r>
+            <a:r>
+              <a:rPr lang="da-DK" b="0" i="0" dirty="0" err="1">
+                <a:solidFill>
+                  <a:srgbClr val="D4D4D4"/>
+                </a:solidFill>
+                <a:effectLst/>
+                <a:latin typeface="Consolas" panose="020B0609020204030204" pitchFamily="49" charset="0"/>
+              </a:rPr>
+              <a:t>distutils</a:t>
+            </a:r>
+            <a:r>
+              <a:rPr lang="da-DK" b="0" i="0">
+                <a:solidFill>
+                  <a:srgbClr val="D4D4D4"/>
+                </a:solidFill>
+                <a:effectLst/>
+                <a:latin typeface="Consolas" panose="020B0609020204030204" pitchFamily="49" charset="0"/>
+              </a:rPr>
+              <a:t>.</a:t>
             </a:r>
             <a:endParaRPr lang="en-US" dirty="0"/>
           </a:p>
@@ -2724,7 +2810,7 @@
           <a:p>
             <a:fld id="{0560A9CD-0304-4E0B-9E82-E7E0115DE05B}" type="datetimeFigureOut">
               <a:rPr lang="en-US" smtClean="0"/>
-              <a:t>4/24/2024</a:t>
+              <a:t>4/25/2024</a:t>
             </a:fld>
             <a:endParaRPr lang="en-US"/>
           </a:p>
@@ -2892,7 +2978,7 @@
           <a:p>
             <a:fld id="{0560A9CD-0304-4E0B-9E82-E7E0115DE05B}" type="datetimeFigureOut">
               <a:rPr lang="en-US" smtClean="0"/>
-              <a:t>4/24/2024</a:t>
+              <a:t>4/25/2024</a:t>
             </a:fld>
             <a:endParaRPr lang="en-US"/>
           </a:p>
@@ -3070,7 +3156,7 @@
           <a:p>
             <a:fld id="{0560A9CD-0304-4E0B-9E82-E7E0115DE05B}" type="datetimeFigureOut">
               <a:rPr lang="en-US" smtClean="0"/>
-              <a:t>4/24/2024</a:t>
+              <a:t>4/25/2024</a:t>
             </a:fld>
             <a:endParaRPr lang="en-US"/>
           </a:p>
@@ -3253,7 +3339,7 @@
           <a:p>
             <a:fld id="{0560A9CD-0304-4E0B-9E82-E7E0115DE05B}" type="datetimeFigureOut">
               <a:rPr lang="en-US" smtClean="0"/>
-              <a:t>4/24/2024</a:t>
+              <a:t>4/25/2024</a:t>
             </a:fld>
             <a:endParaRPr lang="en-US"/>
           </a:p>
@@ -3498,7 +3584,7 @@
           <a:p>
             <a:fld id="{0560A9CD-0304-4E0B-9E82-E7E0115DE05B}" type="datetimeFigureOut">
               <a:rPr lang="en-US" smtClean="0"/>
-              <a:t>4/24/2024</a:t>
+              <a:t>4/25/2024</a:t>
             </a:fld>
             <a:endParaRPr lang="en-US"/>
           </a:p>
@@ -3727,7 +3813,7 @@
           <a:p>
             <a:fld id="{0560A9CD-0304-4E0B-9E82-E7E0115DE05B}" type="datetimeFigureOut">
               <a:rPr lang="en-US" smtClean="0"/>
-              <a:t>4/24/2024</a:t>
+              <a:t>4/25/2024</a:t>
             </a:fld>
             <a:endParaRPr lang="en-US"/>
           </a:p>
@@ -4091,7 +4177,7 @@
           <a:p>
             <a:fld id="{0560A9CD-0304-4E0B-9E82-E7E0115DE05B}" type="datetimeFigureOut">
               <a:rPr lang="en-US" smtClean="0"/>
-              <a:t>4/24/2024</a:t>
+              <a:t>4/25/2024</a:t>
             </a:fld>
             <a:endParaRPr lang="en-US"/>
           </a:p>
@@ -4208,7 +4294,7 @@
           <a:p>
             <a:fld id="{0560A9CD-0304-4E0B-9E82-E7E0115DE05B}" type="datetimeFigureOut">
               <a:rPr lang="en-US" smtClean="0"/>
-              <a:t>4/24/2024</a:t>
+              <a:t>4/25/2024</a:t>
             </a:fld>
             <a:endParaRPr lang="en-US"/>
           </a:p>
@@ -4303,7 +4389,7 @@
           <a:p>
             <a:fld id="{0560A9CD-0304-4E0B-9E82-E7E0115DE05B}" type="datetimeFigureOut">
               <a:rPr lang="en-US" smtClean="0"/>
-              <a:t>4/24/2024</a:t>
+              <a:t>4/25/2024</a:t>
             </a:fld>
             <a:endParaRPr lang="en-US"/>
           </a:p>
@@ -4578,7 +4664,7 @@
           <a:p>
             <a:fld id="{0560A9CD-0304-4E0B-9E82-E7E0115DE05B}" type="datetimeFigureOut">
               <a:rPr lang="en-US" smtClean="0"/>
-              <a:t>4/24/2024</a:t>
+              <a:t>4/25/2024</a:t>
             </a:fld>
             <a:endParaRPr lang="en-US"/>
           </a:p>
@@ -4830,7 +4916,7 @@
           <a:p>
             <a:fld id="{0560A9CD-0304-4E0B-9E82-E7E0115DE05B}" type="datetimeFigureOut">
               <a:rPr lang="en-US" smtClean="0"/>
-              <a:t>4/24/2024</a:t>
+              <a:t>4/25/2024</a:t>
             </a:fld>
             <a:endParaRPr lang="en-US"/>
           </a:p>
@@ -5041,7 +5127,7 @@
           <a:p>
             <a:fld id="{0560A9CD-0304-4E0B-9E82-E7E0115DE05B}" type="datetimeFigureOut">
               <a:rPr lang="en-US" smtClean="0"/>
-              <a:t>4/24/2024</a:t>
+              <a:t>4/25/2024</a:t>
             </a:fld>
             <a:endParaRPr lang="en-US"/>
           </a:p>
@@ -10894,22 +10980,27 @@
       </p:grpSpPr>
       <p:pic>
         <p:nvPicPr>
-          <p:cNvPr id="4" name="Picture 3"/>
+          <p:cNvPr id="12" name="Picture 11">
+            <a:extLst>
+              <a:ext uri="{FF2B5EF4-FFF2-40B4-BE49-F238E27FC236}">
+                <a16:creationId xmlns:a16="http://schemas.microsoft.com/office/drawing/2014/main" id="{F1436066-3A6F-7077-602B-9458C16BC9E7}"/>
+              </a:ext>
+            </a:extLst>
+          </p:cNvPr>
           <p:cNvPicPr>
             <a:picLocks noChangeAspect="1"/>
           </p:cNvPicPr>
           <p:nvPr/>
         </p:nvPicPr>
-        <p:blipFill>
+        <p:blipFill rotWithShape="1">
           <a:blip r:embed="rId3"/>
-          <a:stretch>
-            <a:fillRect/>
-          </a:stretch>
+          <a:srcRect b="2424"/>
+          <a:stretch/>
         </p:blipFill>
         <p:spPr>
           <a:xfrm>
-            <a:off x="1044665" y="1983473"/>
-            <a:ext cx="10055225" cy="2126483"/>
+            <a:off x="49160" y="2246508"/>
+            <a:ext cx="11848374" cy="1981363"/>
           </a:xfrm>
           <a:prstGeom prst="rect">
             <a:avLst/>
@@ -11482,13 +11573,13 @@
         </p:nvSpPr>
         <p:spPr>
           <a:xfrm>
-            <a:off x="905640" y="901066"/>
+            <a:off x="669664" y="1087878"/>
             <a:ext cx="10515600" cy="1082408"/>
           </a:xfrm>
         </p:spPr>
         <p:txBody>
           <a:bodyPr>
-            <a:normAutofit/>
+            <a:normAutofit fontScale="77500" lnSpcReduction="20000"/>
           </a:bodyPr>
           <a:lstStyle/>
           <a:p>
@@ -11525,55 +11616,27 @@
               </a:rPr>
               <a:t>)</a:t>
             </a:r>
-            <a:endParaRPr lang="pt-BR" dirty="0">
-              <a:cs typeface="Courier New" panose="02070309020205020404" pitchFamily="49" charset="0"/>
-            </a:endParaRPr>
           </a:p>
-        </p:txBody>
-      </p:sp>
-      <p:sp>
-        <p:nvSpPr>
-          <p:cNvPr id="3" name="TextBox 2">
-            <a:extLst>
-              <a:ext uri="{FF2B5EF4-FFF2-40B4-BE49-F238E27FC236}">
-                <a16:creationId xmlns:a16="http://schemas.microsoft.com/office/drawing/2014/main" id="{3B970628-4B29-E02B-5D54-D015E47C3776}"/>
-              </a:ext>
-            </a:extLst>
-          </p:cNvPr>
-          <p:cNvSpPr txBox="1"/>
-          <p:nvPr/>
-        </p:nvSpPr>
-        <p:spPr>
-          <a:xfrm>
-            <a:off x="9698673" y="196333"/>
-            <a:ext cx="2365953" cy="495108"/>
-          </a:xfrm>
-          <a:prstGeom prst="rect">
-            <a:avLst/>
-          </a:prstGeom>
-          <a:noFill/>
-        </p:spPr>
-        <p:txBody>
-          <a:bodyPr wrap="square" lIns="72000" tIns="108000" bIns="108000" rtlCol="0">
-            <a:spAutoFit/>
-          </a:bodyPr>
-          <a:lstStyle/>
           <a:p>
             <a:r>
-              <a:rPr lang="da-DK" dirty="0" err="1">
-                <a:highlight>
-                  <a:srgbClr val="FFFF00"/>
-                </a:highlight>
+              <a:rPr lang="pt-BR" dirty="0">
+                <a:latin typeface="Courier New" panose="02070309020205020404" pitchFamily="49" charset="0"/>
+                <a:cs typeface="Courier New" panose="02070309020205020404" pitchFamily="49" charset="0"/>
               </a:rPr>
-              <a:t>Requires</a:t>
-            </a:r>
-            <a:r>
-              <a:rPr lang="da-DK" dirty="0">
-                <a:highlight>
-                  <a:srgbClr val="FFFF00"/>
-                </a:highlight>
+              <a:t>pip install pandas-datareader</a:t>
+            </a:r>
+            <a:r>
+              <a:rPr lang="pt-BR" dirty="0">
+                <a:cs typeface="Courier New" panose="02070309020205020404" pitchFamily="49" charset="0"/>
               </a:rPr>
-              <a:t> Python ≤ 3.11</a:t>
+              <a:t>  and  </a:t>
+            </a:r>
+            <a:r>
+              <a:rPr lang="pt-BR" dirty="0">
+                <a:latin typeface="Courier New" panose="02070309020205020404" pitchFamily="49" charset="0"/>
+                <a:cs typeface="Courier New" panose="02070309020205020404" pitchFamily="49" charset="0"/>
+              </a:rPr>
+              <a:t>pip install setuptools</a:t>
             </a:r>
           </a:p>
         </p:txBody>
@@ -16802,13 +16865,7 @@
               <a:rPr lang="en-US" dirty="0">
                 <a:hlinkClick r:id="rId3"/>
               </a:rPr>
-              <a:t>Database</a:t>
-            </a:r>
-            <a:r>
-              <a:rPr lang="en-US" dirty="0">
-                <a:hlinkClick r:id="rId3"/>
-              </a:rPr>
-              <a:t>s</a:t>
+              <a:t>Databases</a:t>
             </a:r>
             <a:r>
               <a:rPr lang="en-US" dirty="0"/>

</xml_diff>